<commit_message>
Akimoto's title typo fixed.
</commit_message>
<xml_diff>
--- a/forum2010Annai.pptx
+++ b/forum2010Annai.pptx
@@ -289,7 +289,7 @@
             <a:fld id="{AB3A7607-3C98-4BC2-8F5F-F8FBE4E28EFF}" type="datetimeFigureOut">
               <a:rPr kumimoji="1" lang="ja-JP" altLang="en-US" smtClean="0"/>
               <a:pPr/>
-              <a:t>2010/11/4</a:t>
+              <a:t>2010/11/12</a:t>
             </a:fld>
             <a:endParaRPr kumimoji="1" lang="ja-JP" altLang="en-US"/>
           </a:p>
@@ -488,7 +488,7 @@
             <a:fld id="{AB3A7607-3C98-4BC2-8F5F-F8FBE4E28EFF}" type="datetimeFigureOut">
               <a:rPr kumimoji="1" lang="ja-JP" altLang="en-US" smtClean="0"/>
               <a:pPr/>
-              <a:t>2010/11/4</a:t>
+              <a:t>2010/11/12</a:t>
             </a:fld>
             <a:endParaRPr kumimoji="1" lang="ja-JP" altLang="en-US"/>
           </a:p>
@@ -697,7 +697,7 @@
             <a:fld id="{AB3A7607-3C98-4BC2-8F5F-F8FBE4E28EFF}" type="datetimeFigureOut">
               <a:rPr kumimoji="1" lang="ja-JP" altLang="en-US" smtClean="0"/>
               <a:pPr/>
-              <a:t>2010/11/4</a:t>
+              <a:t>2010/11/12</a:t>
             </a:fld>
             <a:endParaRPr kumimoji="1" lang="ja-JP" altLang="en-US"/>
           </a:p>
@@ -896,7 +896,7 @@
             <a:fld id="{AB3A7607-3C98-4BC2-8F5F-F8FBE4E28EFF}" type="datetimeFigureOut">
               <a:rPr kumimoji="1" lang="ja-JP" altLang="en-US" smtClean="0"/>
               <a:pPr/>
-              <a:t>2010/11/4</a:t>
+              <a:t>2010/11/12</a:t>
             </a:fld>
             <a:endParaRPr kumimoji="1" lang="ja-JP" altLang="en-US"/>
           </a:p>
@@ -1139,7 +1139,7 @@
             <a:fld id="{AB3A7607-3C98-4BC2-8F5F-F8FBE4E28EFF}" type="datetimeFigureOut">
               <a:rPr kumimoji="1" lang="ja-JP" altLang="en-US" smtClean="0"/>
               <a:pPr/>
-              <a:t>2010/11/4</a:t>
+              <a:t>2010/11/12</a:t>
             </a:fld>
             <a:endParaRPr kumimoji="1" lang="ja-JP" altLang="en-US"/>
           </a:p>
@@ -1488,7 +1488,7 @@
             <a:fld id="{AB3A7607-3C98-4BC2-8F5F-F8FBE4E28EFF}" type="datetimeFigureOut">
               <a:rPr kumimoji="1" lang="ja-JP" altLang="en-US" smtClean="0"/>
               <a:pPr/>
-              <a:t>2010/11/4</a:t>
+              <a:t>2010/11/12</a:t>
             </a:fld>
             <a:endParaRPr kumimoji="1" lang="ja-JP" altLang="en-US"/>
           </a:p>
@@ -1976,7 +1976,7 @@
             <a:fld id="{AB3A7607-3C98-4BC2-8F5F-F8FBE4E28EFF}" type="datetimeFigureOut">
               <a:rPr kumimoji="1" lang="ja-JP" altLang="en-US" smtClean="0"/>
               <a:pPr/>
-              <a:t>2010/11/4</a:t>
+              <a:t>2010/11/12</a:t>
             </a:fld>
             <a:endParaRPr kumimoji="1" lang="ja-JP" altLang="en-US"/>
           </a:p>
@@ -2091,7 +2091,7 @@
             <a:fld id="{AB3A7607-3C98-4BC2-8F5F-F8FBE4E28EFF}" type="datetimeFigureOut">
               <a:rPr kumimoji="1" lang="ja-JP" altLang="en-US" smtClean="0"/>
               <a:pPr/>
-              <a:t>2010/11/4</a:t>
+              <a:t>2010/11/12</a:t>
             </a:fld>
             <a:endParaRPr kumimoji="1" lang="ja-JP" altLang="en-US"/>
           </a:p>
@@ -2183,7 +2183,7 @@
             <a:fld id="{AB3A7607-3C98-4BC2-8F5F-F8FBE4E28EFF}" type="datetimeFigureOut">
               <a:rPr kumimoji="1" lang="ja-JP" altLang="en-US" smtClean="0"/>
               <a:pPr/>
-              <a:t>2010/11/4</a:t>
+              <a:t>2010/11/12</a:t>
             </a:fld>
             <a:endParaRPr kumimoji="1" lang="ja-JP" altLang="en-US"/>
           </a:p>
@@ -2489,7 +2489,7 @@
             <a:fld id="{AB3A7607-3C98-4BC2-8F5F-F8FBE4E28EFF}" type="datetimeFigureOut">
               <a:rPr kumimoji="1" lang="ja-JP" altLang="en-US" smtClean="0"/>
               <a:pPr/>
-              <a:t>2010/11/4</a:t>
+              <a:t>2010/11/12</a:t>
             </a:fld>
             <a:endParaRPr kumimoji="1" lang="ja-JP" altLang="en-US"/>
           </a:p>
@@ -2739,7 +2739,7 @@
             <a:fld id="{AB3A7607-3C98-4BC2-8F5F-F8FBE4E28EFF}" type="datetimeFigureOut">
               <a:rPr kumimoji="1" lang="ja-JP" altLang="en-US" smtClean="0"/>
               <a:pPr/>
-              <a:t>2010/11/4</a:t>
+              <a:t>2010/11/12</a:t>
             </a:fld>
             <a:endParaRPr kumimoji="1" lang="ja-JP" altLang="en-US"/>
           </a:p>
@@ -2981,7 +2981,7 @@
             <a:fld id="{AB3A7607-3C98-4BC2-8F5F-F8FBE4E28EFF}" type="datetimeFigureOut">
               <a:rPr kumimoji="1" lang="ja-JP" altLang="en-US" smtClean="0"/>
               <a:pPr/>
-              <a:t>2010/11/4</a:t>
+              <a:t>2010/11/12</a:t>
             </a:fld>
             <a:endParaRPr kumimoji="1" lang="ja-JP" altLang="en-US"/>
           </a:p>
@@ -4339,7 +4339,33 @@
                           <a:ea typeface="ＭＳ Ｐゴシック" pitchFamily="50" charset="-128"/>
                           <a:cs typeface="+mn-cs"/>
                         </a:rPr>
-                        <a:t>の多言語対応に向けた取組と事例報告」 </a:t>
+                        <a:t>の</a:t>
+                      </a:r>
+                      <a:r>
+                        <a:rPr kumimoji="1" lang="ja-JP" altLang="en-US" sz="1200" b="1" kern="1200" baseline="0" dirty="0" smtClean="0">
+                          <a:solidFill>
+                            <a:schemeClr val="accent3">
+                              <a:lumMod val="50000"/>
+                            </a:schemeClr>
+                          </a:solidFill>
+                          <a:latin typeface="Verdana" pitchFamily="34" charset="0"/>
+                          <a:ea typeface="ＭＳ Ｐゴシック" pitchFamily="50" charset="-128"/>
+                          <a:cs typeface="+mn-cs"/>
+                        </a:rPr>
+                        <a:t>多国語対応</a:t>
+                      </a:r>
+                      <a:r>
+                        <a:rPr kumimoji="1" lang="ja-JP" altLang="en-US" sz="1200" b="1" kern="1200" baseline="0" dirty="0" smtClean="0">
+                          <a:solidFill>
+                            <a:schemeClr val="accent3">
+                              <a:lumMod val="50000"/>
+                            </a:schemeClr>
+                          </a:solidFill>
+                          <a:latin typeface="Verdana" pitchFamily="34" charset="0"/>
+                          <a:ea typeface="ＭＳ Ｐゴシック" pitchFamily="50" charset="-128"/>
+                          <a:cs typeface="+mn-cs"/>
+                        </a:rPr>
+                        <a:t>に向けた取組と事例報告」 </a:t>
                       </a:r>
                       <a:r>
                         <a:rPr kumimoji="1" lang="en-US" altLang="ja-JP" sz="1200" b="1" kern="1200" baseline="0" dirty="0" smtClean="0">

</xml_diff>